<commit_message>
Modifoed proxy with content counting section in the report and darw a diagram for it
</commit_message>
<xml_diff>
--- a/report/overview_diagrams.pptx
+++ b/report/overview_diagrams.pptx
@@ -7,7 +7,8 @@
   <p:sldIdLst>
     <p:sldId id="257" r:id="rId2"/>
     <p:sldId id="258" r:id="rId3"/>
-    <p:sldId id="260" r:id="rId4"/>
+    <p:sldId id="261" r:id="rId4"/>
+    <p:sldId id="260" r:id="rId5"/>
   </p:sldIdLst>
   <p:sldSz cx="9144000" cy="6858000" type="screen4x3"/>
   <p:notesSz cx="6858000" cy="9144000"/>
@@ -290,7 +291,7 @@
           <a:p>
             <a:fld id="{E60D2AC5-1717-184A-BDAF-E3EF29711C32}" type="datetimeFigureOut">
               <a:rPr lang="en-US" smtClean="0"/>
-              <a:t>05/08/2014</a:t>
+              <a:t>13/08/2014</a:t>
             </a:fld>
             <a:endParaRPr lang="en-US"/>
           </a:p>
@@ -460,7 +461,7 @@
           <a:p>
             <a:fld id="{E60D2AC5-1717-184A-BDAF-E3EF29711C32}" type="datetimeFigureOut">
               <a:rPr lang="en-US" smtClean="0"/>
-              <a:t>05/08/2014</a:t>
+              <a:t>13/08/2014</a:t>
             </a:fld>
             <a:endParaRPr lang="en-US"/>
           </a:p>
@@ -640,7 +641,7 @@
           <a:p>
             <a:fld id="{E60D2AC5-1717-184A-BDAF-E3EF29711C32}" type="datetimeFigureOut">
               <a:rPr lang="en-US" smtClean="0"/>
-              <a:t>05/08/2014</a:t>
+              <a:t>13/08/2014</a:t>
             </a:fld>
             <a:endParaRPr lang="en-US"/>
           </a:p>
@@ -810,7 +811,7 @@
           <a:p>
             <a:fld id="{E60D2AC5-1717-184A-BDAF-E3EF29711C32}" type="datetimeFigureOut">
               <a:rPr lang="en-US" smtClean="0"/>
-              <a:t>05/08/2014</a:t>
+              <a:t>13/08/2014</a:t>
             </a:fld>
             <a:endParaRPr lang="en-US"/>
           </a:p>
@@ -1056,7 +1057,7 @@
           <a:p>
             <a:fld id="{E60D2AC5-1717-184A-BDAF-E3EF29711C32}" type="datetimeFigureOut">
               <a:rPr lang="en-US" smtClean="0"/>
-              <a:t>05/08/2014</a:t>
+              <a:t>13/08/2014</a:t>
             </a:fld>
             <a:endParaRPr lang="en-US"/>
           </a:p>
@@ -1344,7 +1345,7 @@
           <a:p>
             <a:fld id="{E60D2AC5-1717-184A-BDAF-E3EF29711C32}" type="datetimeFigureOut">
               <a:rPr lang="en-US" smtClean="0"/>
-              <a:t>05/08/2014</a:t>
+              <a:t>13/08/2014</a:t>
             </a:fld>
             <a:endParaRPr lang="en-US"/>
           </a:p>
@@ -1766,7 +1767,7 @@
           <a:p>
             <a:fld id="{E60D2AC5-1717-184A-BDAF-E3EF29711C32}" type="datetimeFigureOut">
               <a:rPr lang="en-US" smtClean="0"/>
-              <a:t>05/08/2014</a:t>
+              <a:t>13/08/2014</a:t>
             </a:fld>
             <a:endParaRPr lang="en-US"/>
           </a:p>
@@ -1884,7 +1885,7 @@
           <a:p>
             <a:fld id="{E60D2AC5-1717-184A-BDAF-E3EF29711C32}" type="datetimeFigureOut">
               <a:rPr lang="en-US" smtClean="0"/>
-              <a:t>05/08/2014</a:t>
+              <a:t>13/08/2014</a:t>
             </a:fld>
             <a:endParaRPr lang="en-US"/>
           </a:p>
@@ -1979,7 +1980,7 @@
           <a:p>
             <a:fld id="{E60D2AC5-1717-184A-BDAF-E3EF29711C32}" type="datetimeFigureOut">
               <a:rPr lang="en-US" smtClean="0"/>
-              <a:t>05/08/2014</a:t>
+              <a:t>13/08/2014</a:t>
             </a:fld>
             <a:endParaRPr lang="en-US"/>
           </a:p>
@@ -2256,7 +2257,7 @@
           <a:p>
             <a:fld id="{E60D2AC5-1717-184A-BDAF-E3EF29711C32}" type="datetimeFigureOut">
               <a:rPr lang="en-US" smtClean="0"/>
-              <a:t>05/08/2014</a:t>
+              <a:t>13/08/2014</a:t>
             </a:fld>
             <a:endParaRPr lang="en-US"/>
           </a:p>
@@ -2509,7 +2510,7 @@
           <a:p>
             <a:fld id="{E60D2AC5-1717-184A-BDAF-E3EF29711C32}" type="datetimeFigureOut">
               <a:rPr lang="en-US" smtClean="0"/>
-              <a:t>05/08/2014</a:t>
+              <a:t>13/08/2014</a:t>
             </a:fld>
             <a:endParaRPr lang="en-US"/>
           </a:p>
@@ -2722,7 +2723,7 @@
           <a:p>
             <a:fld id="{E60D2AC5-1717-184A-BDAF-E3EF29711C32}" type="datetimeFigureOut">
               <a:rPr lang="en-US" smtClean="0"/>
-              <a:t>05/08/2014</a:t>
+              <a:t>13/08/2014</a:t>
             </a:fld>
             <a:endParaRPr lang="en-US"/>
           </a:p>
@@ -7194,6 +7195,1326 @@
       </p:grpSpPr>
       <p:sp>
         <p:nvSpPr>
+          <p:cNvPr id="143" name="Rectangle 142"/>
+          <p:cNvSpPr/>
+          <p:nvPr/>
+        </p:nvSpPr>
+        <p:spPr>
+          <a:xfrm rot="16200000">
+            <a:off x="-2028022" y="3723149"/>
+            <a:ext cx="4591948" cy="345750"/>
+          </a:xfrm>
+          <a:prstGeom prst="rect">
+            <a:avLst/>
+          </a:prstGeom>
+          <a:solidFill>
+            <a:schemeClr val="accent6">
+              <a:lumMod val="20000"/>
+              <a:lumOff val="80000"/>
+            </a:schemeClr>
+          </a:solidFill>
+          <a:ln w="19050" cmpd="sng">
+            <a:solidFill>
+              <a:schemeClr val="tx1"/>
+            </a:solidFill>
+          </a:ln>
+        </p:spPr>
+        <p:style>
+          <a:lnRef idx="1">
+            <a:schemeClr val="accent1"/>
+          </a:lnRef>
+          <a:fillRef idx="3">
+            <a:schemeClr val="accent1"/>
+          </a:fillRef>
+          <a:effectRef idx="2">
+            <a:schemeClr val="accent1"/>
+          </a:effectRef>
+          <a:fontRef idx="minor">
+            <a:schemeClr val="lt1"/>
+          </a:fontRef>
+        </p:style>
+        <p:txBody>
+          <a:bodyPr rtlCol="0" anchor="ctr"/>
+          <a:lstStyle/>
+          <a:p>
+            <a:pPr algn="ctr"/>
+            <a:r>
+              <a:rPr lang="en-US" sz="1100" dirty="0" smtClean="0">
+                <a:solidFill>
+                  <a:schemeClr val="tx1"/>
+                </a:solidFill>
+                <a:latin typeface="Helvetica"/>
+                <a:cs typeface="Helvetica"/>
+              </a:rPr>
+              <a:t>Client</a:t>
+            </a:r>
+            <a:endParaRPr lang="en-US" sz="1100" dirty="0">
+              <a:solidFill>
+                <a:schemeClr val="tx1"/>
+              </a:solidFill>
+              <a:latin typeface="Helvetica"/>
+              <a:cs typeface="Helvetica"/>
+            </a:endParaRPr>
+          </a:p>
+        </p:txBody>
+      </p:sp>
+      <p:sp>
+        <p:nvSpPr>
+          <p:cNvPr id="149" name="Rectangle 148"/>
+          <p:cNvSpPr/>
+          <p:nvPr/>
+        </p:nvSpPr>
+        <p:spPr>
+          <a:xfrm>
+            <a:off x="440827" y="2311159"/>
+            <a:ext cx="853689" cy="311676"/>
+          </a:xfrm>
+          <a:prstGeom prst="rect">
+            <a:avLst/>
+          </a:prstGeom>
+          <a:noFill/>
+          <a:ln w="19050" cmpd="sng">
+            <a:noFill/>
+          </a:ln>
+        </p:spPr>
+        <p:style>
+          <a:lnRef idx="1">
+            <a:schemeClr val="accent1"/>
+          </a:lnRef>
+          <a:fillRef idx="3">
+            <a:schemeClr val="accent1"/>
+          </a:fillRef>
+          <a:effectRef idx="2">
+            <a:schemeClr val="accent1"/>
+          </a:effectRef>
+          <a:fontRef idx="minor">
+            <a:schemeClr val="lt1"/>
+          </a:fontRef>
+        </p:style>
+        <p:txBody>
+          <a:bodyPr rtlCol="0" anchor="ctr"/>
+          <a:lstStyle/>
+          <a:p>
+            <a:r>
+              <a:rPr lang="en-US" sz="1100" dirty="0" smtClean="0">
+                <a:solidFill>
+                  <a:schemeClr val="tx1"/>
+                </a:solidFill>
+                <a:latin typeface="Helvetica"/>
+                <a:cs typeface="Helvetica"/>
+              </a:rPr>
+              <a:t>Connect</a:t>
+            </a:r>
+            <a:endParaRPr lang="en-US" sz="1100" dirty="0" smtClean="0">
+              <a:solidFill>
+                <a:schemeClr val="tx1"/>
+              </a:solidFill>
+              <a:latin typeface="Helvetica"/>
+              <a:cs typeface="Helvetica"/>
+            </a:endParaRPr>
+          </a:p>
+        </p:txBody>
+      </p:sp>
+      <p:cxnSp>
+        <p:nvCxnSpPr>
+          <p:cNvPr id="150" name="Straight Arrow Connector 149"/>
+          <p:cNvCxnSpPr>
+            <a:cxnSpLocks/>
+          </p:cNvCxnSpPr>
+          <p:nvPr/>
+        </p:nvCxnSpPr>
+        <p:spPr>
+          <a:xfrm>
+            <a:off x="449990" y="2622835"/>
+            <a:ext cx="900000" cy="1"/>
+          </a:xfrm>
+          <a:prstGeom prst="straightConnector1">
+            <a:avLst/>
+          </a:prstGeom>
+          <a:ln w="19050" cmpd="sng">
+            <a:tailEnd type="arrow"/>
+          </a:ln>
+        </p:spPr>
+        <p:style>
+          <a:lnRef idx="2">
+            <a:schemeClr val="dk1"/>
+          </a:lnRef>
+          <a:fillRef idx="0">
+            <a:schemeClr val="dk1"/>
+          </a:fillRef>
+          <a:effectRef idx="1">
+            <a:schemeClr val="dk1"/>
+          </a:effectRef>
+          <a:fontRef idx="minor">
+            <a:schemeClr val="tx1"/>
+          </a:fontRef>
+        </p:style>
+      </p:cxnSp>
+      <p:sp>
+        <p:nvSpPr>
+          <p:cNvPr id="159" name="Rectangle 158"/>
+          <p:cNvSpPr/>
+          <p:nvPr/>
+        </p:nvSpPr>
+        <p:spPr>
+          <a:xfrm rot="16200000">
+            <a:off x="6569151" y="3719493"/>
+            <a:ext cx="4591948" cy="345750"/>
+          </a:xfrm>
+          <a:prstGeom prst="rect">
+            <a:avLst/>
+          </a:prstGeom>
+          <a:solidFill>
+            <a:schemeClr val="accent6">
+              <a:lumMod val="20000"/>
+              <a:lumOff val="80000"/>
+            </a:schemeClr>
+          </a:solidFill>
+          <a:ln w="19050" cmpd="sng">
+            <a:solidFill>
+              <a:schemeClr val="tx1"/>
+            </a:solidFill>
+          </a:ln>
+        </p:spPr>
+        <p:style>
+          <a:lnRef idx="1">
+            <a:schemeClr val="accent1"/>
+          </a:lnRef>
+          <a:fillRef idx="3">
+            <a:schemeClr val="accent1"/>
+          </a:fillRef>
+          <a:effectRef idx="2">
+            <a:schemeClr val="accent1"/>
+          </a:effectRef>
+          <a:fontRef idx="minor">
+            <a:schemeClr val="lt1"/>
+          </a:fontRef>
+        </p:style>
+        <p:txBody>
+          <a:bodyPr rtlCol="0" anchor="ctr"/>
+          <a:lstStyle/>
+          <a:p>
+            <a:pPr algn="ctr"/>
+            <a:r>
+              <a:rPr lang="en-US" sz="1100" dirty="0" smtClean="0">
+                <a:solidFill>
+                  <a:schemeClr val="tx1"/>
+                </a:solidFill>
+                <a:latin typeface="Helvetica"/>
+                <a:cs typeface="Helvetica"/>
+              </a:rPr>
+              <a:t>Cluster</a:t>
+            </a:r>
+            <a:endParaRPr lang="en-US" sz="1100" dirty="0">
+              <a:solidFill>
+                <a:schemeClr val="tx1"/>
+              </a:solidFill>
+              <a:latin typeface="Helvetica"/>
+              <a:cs typeface="Helvetica"/>
+            </a:endParaRPr>
+          </a:p>
+        </p:txBody>
+      </p:sp>
+      <p:sp>
+        <p:nvSpPr>
+          <p:cNvPr id="167" name="Rectangle 166"/>
+          <p:cNvSpPr/>
+          <p:nvPr/>
+        </p:nvSpPr>
+        <p:spPr>
+          <a:xfrm>
+            <a:off x="7649770" y="3708869"/>
+            <a:ext cx="693384" cy="311676"/>
+          </a:xfrm>
+          <a:prstGeom prst="rect">
+            <a:avLst/>
+          </a:prstGeom>
+          <a:noFill/>
+          <a:ln w="19050" cmpd="sng">
+            <a:noFill/>
+          </a:ln>
+        </p:spPr>
+        <p:style>
+          <a:lnRef idx="1">
+            <a:schemeClr val="accent1"/>
+          </a:lnRef>
+          <a:fillRef idx="3">
+            <a:schemeClr val="accent1"/>
+          </a:fillRef>
+          <a:effectRef idx="2">
+            <a:schemeClr val="accent1"/>
+          </a:effectRef>
+          <a:fontRef idx="minor">
+            <a:schemeClr val="lt1"/>
+          </a:fontRef>
+        </p:style>
+        <p:txBody>
+          <a:bodyPr rtlCol="0" anchor="ctr"/>
+          <a:lstStyle/>
+          <a:p>
+            <a:pPr algn="r"/>
+            <a:r>
+              <a:rPr lang="en-US" sz="1100" dirty="0" smtClean="0">
+                <a:solidFill>
+                  <a:schemeClr val="tx1"/>
+                </a:solidFill>
+                <a:latin typeface="Helvetica"/>
+                <a:cs typeface="Helvetica"/>
+              </a:rPr>
+              <a:t>Read</a:t>
+            </a:r>
+            <a:endParaRPr lang="en-US" sz="1100" dirty="0" smtClean="0">
+              <a:solidFill>
+                <a:schemeClr val="tx1"/>
+              </a:solidFill>
+              <a:latin typeface="Helvetica"/>
+              <a:cs typeface="Helvetica"/>
+            </a:endParaRPr>
+          </a:p>
+        </p:txBody>
+      </p:sp>
+      <p:cxnSp>
+        <p:nvCxnSpPr>
+          <p:cNvPr id="168" name="Straight Arrow Connector 167"/>
+          <p:cNvCxnSpPr>
+            <a:cxnSpLocks/>
+          </p:cNvCxnSpPr>
+          <p:nvPr/>
+        </p:nvCxnSpPr>
+        <p:spPr>
+          <a:xfrm flipV="1">
+            <a:off x="7621870" y="4514343"/>
+            <a:ext cx="900000" cy="1"/>
+          </a:xfrm>
+          <a:prstGeom prst="straightConnector1">
+            <a:avLst/>
+          </a:prstGeom>
+          <a:ln w="19050" cmpd="sng">
+            <a:headEnd type="arrow"/>
+            <a:tailEnd type="none"/>
+          </a:ln>
+        </p:spPr>
+        <p:style>
+          <a:lnRef idx="2">
+            <a:schemeClr val="dk1"/>
+          </a:lnRef>
+          <a:fillRef idx="0">
+            <a:schemeClr val="dk1"/>
+          </a:fillRef>
+          <a:effectRef idx="1">
+            <a:schemeClr val="dk1"/>
+          </a:effectRef>
+          <a:fontRef idx="minor">
+            <a:schemeClr val="tx1"/>
+          </a:fontRef>
+        </p:style>
+      </p:cxnSp>
+      <p:sp>
+        <p:nvSpPr>
+          <p:cNvPr id="99" name="Rectangle 98"/>
+          <p:cNvSpPr/>
+          <p:nvPr/>
+        </p:nvSpPr>
+        <p:spPr>
+          <a:xfrm>
+            <a:off x="3100219" y="3060700"/>
+            <a:ext cx="4424344" cy="2114667"/>
+          </a:xfrm>
+          <a:prstGeom prst="rect">
+            <a:avLst/>
+          </a:prstGeom>
+          <a:solidFill>
+            <a:schemeClr val="bg2"/>
+          </a:solidFill>
+          <a:ln w="19050" cmpd="sng">
+            <a:solidFill>
+              <a:schemeClr val="tx1"/>
+            </a:solidFill>
+          </a:ln>
+        </p:spPr>
+        <p:style>
+          <a:lnRef idx="1">
+            <a:schemeClr val="accent1"/>
+          </a:lnRef>
+          <a:fillRef idx="3">
+            <a:schemeClr val="accent1"/>
+          </a:fillRef>
+          <a:effectRef idx="2">
+            <a:schemeClr val="accent1"/>
+          </a:effectRef>
+          <a:fontRef idx="minor">
+            <a:schemeClr val="lt1"/>
+          </a:fontRef>
+        </p:style>
+        <p:txBody>
+          <a:bodyPr rtlCol="0" anchor="t" anchorCtr="0"/>
+          <a:lstStyle/>
+          <a:p>
+            <a:pPr algn="ctr"/>
+            <a:endParaRPr lang="en-US" sz="1000" dirty="0">
+              <a:solidFill>
+                <a:schemeClr val="tx1"/>
+              </a:solidFill>
+              <a:latin typeface="Helvetica"/>
+              <a:cs typeface="Helvetica"/>
+            </a:endParaRPr>
+          </a:p>
+        </p:txBody>
+      </p:sp>
+      <p:sp>
+        <p:nvSpPr>
+          <p:cNvPr id="100" name="Rectangle 99"/>
+          <p:cNvSpPr/>
+          <p:nvPr/>
+        </p:nvSpPr>
+        <p:spPr>
+          <a:xfrm>
+            <a:off x="3239919" y="3775807"/>
+            <a:ext cx="1038844" cy="525103"/>
+          </a:xfrm>
+          <a:prstGeom prst="rect">
+            <a:avLst/>
+          </a:prstGeom>
+          <a:solidFill>
+            <a:schemeClr val="accent5">
+              <a:lumMod val="20000"/>
+              <a:lumOff val="80000"/>
+            </a:schemeClr>
+          </a:solidFill>
+          <a:ln w="19050" cmpd="sng">
+            <a:solidFill>
+              <a:schemeClr val="tx1"/>
+            </a:solidFill>
+          </a:ln>
+        </p:spPr>
+        <p:style>
+          <a:lnRef idx="1">
+            <a:schemeClr val="accent1"/>
+          </a:lnRef>
+          <a:fillRef idx="3">
+            <a:schemeClr val="accent1"/>
+          </a:fillRef>
+          <a:effectRef idx="2">
+            <a:schemeClr val="accent1"/>
+          </a:effectRef>
+          <a:fontRef idx="minor">
+            <a:schemeClr val="lt1"/>
+          </a:fontRef>
+        </p:style>
+        <p:txBody>
+          <a:bodyPr rtlCol="0" anchor="ctr"/>
+          <a:lstStyle/>
+          <a:p>
+            <a:pPr algn="ctr"/>
+            <a:r>
+              <a:rPr lang="en-US" sz="1100" dirty="0" smtClean="0">
+                <a:solidFill>
+                  <a:schemeClr val="tx1"/>
+                </a:solidFill>
+                <a:latin typeface="Helvetica"/>
+                <a:cs typeface="Helvetica"/>
+              </a:rPr>
+              <a:t>R</a:t>
+            </a:r>
+            <a:r>
+              <a:rPr lang="en-US" sz="1100" dirty="0" smtClean="0">
+                <a:solidFill>
+                  <a:schemeClr val="tx1"/>
+                </a:solidFill>
+                <a:latin typeface="Helvetica"/>
+                <a:cs typeface="Helvetica"/>
+              </a:rPr>
+              <a:t>outing</a:t>
+            </a:r>
+            <a:endParaRPr lang="en-US" sz="1100" dirty="0">
+              <a:solidFill>
+                <a:schemeClr val="tx1"/>
+              </a:solidFill>
+              <a:latin typeface="Helvetica"/>
+              <a:cs typeface="Helvetica"/>
+            </a:endParaRPr>
+          </a:p>
+        </p:txBody>
+      </p:sp>
+      <p:sp>
+        <p:nvSpPr>
+          <p:cNvPr id="101" name="Circular Arrow 100"/>
+          <p:cNvSpPr/>
+          <p:nvPr/>
+        </p:nvSpPr>
+        <p:spPr>
+          <a:xfrm rot="10800000">
+            <a:off x="1349991" y="1531567"/>
+            <a:ext cx="935999" cy="2196000"/>
+          </a:xfrm>
+          <a:prstGeom prst="circularArrow">
+            <a:avLst>
+              <a:gd name="adj1" fmla="val 12500"/>
+              <a:gd name="adj2" fmla="val 1142319"/>
+              <a:gd name="adj3" fmla="val 20457681"/>
+              <a:gd name="adj4" fmla="val 1198896"/>
+              <a:gd name="adj5" fmla="val 12500"/>
+            </a:avLst>
+          </a:prstGeom>
+          <a:noFill/>
+          <a:ln w="19050" cmpd="sng">
+            <a:solidFill>
+              <a:schemeClr val="tx1"/>
+            </a:solidFill>
+          </a:ln>
+        </p:spPr>
+        <p:style>
+          <a:lnRef idx="1">
+            <a:schemeClr val="accent1"/>
+          </a:lnRef>
+          <a:fillRef idx="3">
+            <a:schemeClr val="accent1"/>
+          </a:fillRef>
+          <a:effectRef idx="2">
+            <a:schemeClr val="accent1"/>
+          </a:effectRef>
+          <a:fontRef idx="minor">
+            <a:schemeClr val="lt1"/>
+          </a:fontRef>
+        </p:style>
+        <p:txBody>
+          <a:bodyPr rtlCol="0" anchor="ctr"/>
+          <a:lstStyle/>
+          <a:p>
+            <a:pPr algn="ctr"/>
+            <a:endParaRPr lang="en-US" sz="1000" dirty="0" smtClean="0">
+              <a:solidFill>
+                <a:schemeClr val="tx1"/>
+              </a:solidFill>
+              <a:latin typeface="Helvetica"/>
+              <a:cs typeface="Helvetica"/>
+            </a:endParaRPr>
+          </a:p>
+        </p:txBody>
+      </p:sp>
+      <p:sp>
+        <p:nvSpPr>
+          <p:cNvPr id="102" name="Rectangle 101"/>
+          <p:cNvSpPr/>
+          <p:nvPr/>
+        </p:nvSpPr>
+        <p:spPr>
+          <a:xfrm>
+            <a:off x="1294517" y="2345821"/>
+            <a:ext cx="991473" cy="426052"/>
+          </a:xfrm>
+          <a:prstGeom prst="rect">
+            <a:avLst/>
+          </a:prstGeom>
+          <a:noFill/>
+          <a:ln w="19050" cmpd="sng">
+            <a:noFill/>
+          </a:ln>
+        </p:spPr>
+        <p:style>
+          <a:lnRef idx="1">
+            <a:schemeClr val="accent1"/>
+          </a:lnRef>
+          <a:fillRef idx="3">
+            <a:schemeClr val="accent1"/>
+          </a:fillRef>
+          <a:effectRef idx="2">
+            <a:schemeClr val="accent1"/>
+          </a:effectRef>
+          <a:fontRef idx="minor">
+            <a:schemeClr val="lt1"/>
+          </a:fontRef>
+        </p:style>
+        <p:txBody>
+          <a:bodyPr rtlCol="0" anchor="ctr"/>
+          <a:lstStyle/>
+          <a:p>
+            <a:pPr algn="ctr"/>
+            <a:r>
+              <a:rPr lang="en-US" sz="1100" dirty="0" smtClean="0">
+                <a:solidFill>
+                  <a:schemeClr val="tx1"/>
+                </a:solidFill>
+                <a:latin typeface="Helvetica"/>
+                <a:cs typeface="Helvetica"/>
+              </a:rPr>
+              <a:t>Accept </a:t>
+            </a:r>
+            <a:endParaRPr lang="en-US" sz="1100" dirty="0" smtClean="0">
+              <a:solidFill>
+                <a:schemeClr val="tx1"/>
+              </a:solidFill>
+              <a:latin typeface="Helvetica"/>
+              <a:cs typeface="Helvetica"/>
+            </a:endParaRPr>
+          </a:p>
+          <a:p>
+            <a:pPr algn="ctr"/>
+            <a:r>
+              <a:rPr lang="en-US" sz="1100" dirty="0" smtClean="0">
+                <a:solidFill>
+                  <a:schemeClr val="tx1"/>
+                </a:solidFill>
+                <a:latin typeface="Helvetica"/>
+                <a:cs typeface="Helvetica"/>
+              </a:rPr>
+              <a:t>Loop</a:t>
+            </a:r>
+            <a:endParaRPr lang="en-US" sz="1100" dirty="0" smtClean="0">
+              <a:solidFill>
+                <a:schemeClr val="tx1"/>
+              </a:solidFill>
+              <a:latin typeface="Helvetica"/>
+              <a:cs typeface="Helvetica"/>
+            </a:endParaRPr>
+          </a:p>
+        </p:txBody>
+      </p:sp>
+      <p:sp>
+        <p:nvSpPr>
+          <p:cNvPr id="103" name="Circular Arrow 102"/>
+          <p:cNvSpPr/>
+          <p:nvPr/>
+        </p:nvSpPr>
+        <p:spPr>
+          <a:xfrm rot="10800000">
+            <a:off x="4842017" y="3166733"/>
+            <a:ext cx="792000" cy="1800000"/>
+          </a:xfrm>
+          <a:prstGeom prst="circularArrow">
+            <a:avLst>
+              <a:gd name="adj1" fmla="val 12500"/>
+              <a:gd name="adj2" fmla="val 1142319"/>
+              <a:gd name="adj3" fmla="val 20457681"/>
+              <a:gd name="adj4" fmla="val 1198896"/>
+              <a:gd name="adj5" fmla="val 12500"/>
+            </a:avLst>
+          </a:prstGeom>
+          <a:noFill/>
+          <a:ln w="19050" cmpd="sng">
+            <a:solidFill>
+              <a:schemeClr val="tx1"/>
+            </a:solidFill>
+          </a:ln>
+        </p:spPr>
+        <p:style>
+          <a:lnRef idx="1">
+            <a:schemeClr val="accent1"/>
+          </a:lnRef>
+          <a:fillRef idx="3">
+            <a:schemeClr val="accent1"/>
+          </a:fillRef>
+          <a:effectRef idx="2">
+            <a:schemeClr val="accent1"/>
+          </a:effectRef>
+          <a:fontRef idx="minor">
+            <a:schemeClr val="lt1"/>
+          </a:fontRef>
+        </p:style>
+        <p:txBody>
+          <a:bodyPr rtlCol="0" anchor="ctr"/>
+          <a:lstStyle/>
+          <a:p>
+            <a:pPr algn="ctr"/>
+            <a:endParaRPr lang="en-US" sz="1000" dirty="0" smtClean="0">
+              <a:solidFill>
+                <a:schemeClr val="tx1"/>
+              </a:solidFill>
+              <a:latin typeface="Helvetica"/>
+              <a:cs typeface="Helvetica"/>
+            </a:endParaRPr>
+          </a:p>
+        </p:txBody>
+      </p:sp>
+      <p:sp>
+        <p:nvSpPr>
+          <p:cNvPr id="105" name="Rectangle 104"/>
+          <p:cNvSpPr/>
+          <p:nvPr/>
+        </p:nvSpPr>
+        <p:spPr>
+          <a:xfrm>
+            <a:off x="4736217" y="3806321"/>
+            <a:ext cx="991473" cy="426052"/>
+          </a:xfrm>
+          <a:prstGeom prst="rect">
+            <a:avLst/>
+          </a:prstGeom>
+          <a:noFill/>
+          <a:ln w="19050" cmpd="sng">
+            <a:noFill/>
+          </a:ln>
+        </p:spPr>
+        <p:style>
+          <a:lnRef idx="1">
+            <a:schemeClr val="accent1"/>
+          </a:lnRef>
+          <a:fillRef idx="3">
+            <a:schemeClr val="accent1"/>
+          </a:fillRef>
+          <a:effectRef idx="2">
+            <a:schemeClr val="accent1"/>
+          </a:effectRef>
+          <a:fontRef idx="minor">
+            <a:schemeClr val="lt1"/>
+          </a:fontRef>
+        </p:style>
+        <p:txBody>
+          <a:bodyPr rtlCol="0" anchor="ctr"/>
+          <a:lstStyle/>
+          <a:p>
+            <a:pPr algn="ctr"/>
+            <a:r>
+              <a:rPr lang="en-US" sz="1100" dirty="0">
+                <a:solidFill>
+                  <a:schemeClr val="tx1"/>
+                </a:solidFill>
+                <a:latin typeface="Helvetica"/>
+                <a:cs typeface="Helvetica"/>
+              </a:rPr>
+              <a:t>R</a:t>
+            </a:r>
+            <a:r>
+              <a:rPr lang="en-US" sz="1100" dirty="0" smtClean="0">
+                <a:solidFill>
+                  <a:schemeClr val="tx1"/>
+                </a:solidFill>
+                <a:latin typeface="Helvetica"/>
+                <a:cs typeface="Helvetica"/>
+              </a:rPr>
+              <a:t>ead</a:t>
+            </a:r>
+          </a:p>
+          <a:p>
+            <a:pPr algn="ctr"/>
+            <a:r>
+              <a:rPr lang="en-US" sz="1100" dirty="0" smtClean="0">
+                <a:solidFill>
+                  <a:schemeClr val="tx1"/>
+                </a:solidFill>
+                <a:latin typeface="Helvetica"/>
+                <a:cs typeface="Helvetica"/>
+              </a:rPr>
+              <a:t>Loop</a:t>
+            </a:r>
+            <a:endParaRPr lang="en-US" sz="1100" dirty="0" smtClean="0">
+              <a:solidFill>
+                <a:schemeClr val="tx1"/>
+              </a:solidFill>
+              <a:latin typeface="Helvetica"/>
+              <a:cs typeface="Helvetica"/>
+            </a:endParaRPr>
+          </a:p>
+        </p:txBody>
+      </p:sp>
+      <p:sp>
+        <p:nvSpPr>
+          <p:cNvPr id="106" name="Rectangle 105"/>
+          <p:cNvSpPr/>
+          <p:nvPr/>
+        </p:nvSpPr>
+        <p:spPr>
+          <a:xfrm>
+            <a:off x="6326019" y="3775807"/>
+            <a:ext cx="1038844" cy="525103"/>
+          </a:xfrm>
+          <a:prstGeom prst="rect">
+            <a:avLst/>
+          </a:prstGeom>
+          <a:solidFill>
+            <a:schemeClr val="accent5">
+              <a:lumMod val="20000"/>
+              <a:lumOff val="80000"/>
+            </a:schemeClr>
+          </a:solidFill>
+          <a:ln w="19050" cmpd="sng">
+            <a:solidFill>
+              <a:schemeClr val="tx1"/>
+            </a:solidFill>
+          </a:ln>
+        </p:spPr>
+        <p:style>
+          <a:lnRef idx="1">
+            <a:schemeClr val="accent1"/>
+          </a:lnRef>
+          <a:fillRef idx="3">
+            <a:schemeClr val="accent1"/>
+          </a:fillRef>
+          <a:effectRef idx="2">
+            <a:schemeClr val="accent1"/>
+          </a:effectRef>
+          <a:fontRef idx="minor">
+            <a:schemeClr val="lt1"/>
+          </a:fontRef>
+        </p:style>
+        <p:txBody>
+          <a:bodyPr rtlCol="0" anchor="ctr"/>
+          <a:lstStyle/>
+          <a:p>
+            <a:pPr algn="ctr"/>
+            <a:r>
+              <a:rPr lang="en-US" sz="1100" dirty="0">
+                <a:solidFill>
+                  <a:schemeClr val="tx1"/>
+                </a:solidFill>
+                <a:latin typeface="Helvetica"/>
+                <a:cs typeface="Helvetica"/>
+              </a:rPr>
+              <a:t>W</a:t>
+            </a:r>
+            <a:r>
+              <a:rPr lang="en-US" sz="1100" dirty="0" smtClean="0">
+                <a:solidFill>
+                  <a:schemeClr val="tx1"/>
+                </a:solidFill>
+                <a:latin typeface="Helvetica"/>
+                <a:cs typeface="Helvetica"/>
+              </a:rPr>
+              <a:t>rite</a:t>
+            </a:r>
+            <a:endParaRPr lang="en-US" sz="1100" dirty="0">
+              <a:solidFill>
+                <a:schemeClr val="tx1"/>
+              </a:solidFill>
+              <a:latin typeface="Helvetica"/>
+              <a:cs typeface="Helvetica"/>
+            </a:endParaRPr>
+          </a:p>
+        </p:txBody>
+      </p:sp>
+      <p:cxnSp>
+        <p:nvCxnSpPr>
+          <p:cNvPr id="107" name="Straight Arrow Connector 106"/>
+          <p:cNvCxnSpPr>
+            <a:cxnSpLocks/>
+          </p:cNvCxnSpPr>
+          <p:nvPr/>
+        </p:nvCxnSpPr>
+        <p:spPr>
+          <a:xfrm flipV="1">
+            <a:off x="5669245" y="4064571"/>
+            <a:ext cx="462480" cy="8797"/>
+          </a:xfrm>
+          <a:prstGeom prst="straightConnector1">
+            <a:avLst/>
+          </a:prstGeom>
+          <a:ln w="19050" cmpd="sng">
+            <a:tailEnd type="arrow"/>
+          </a:ln>
+        </p:spPr>
+        <p:style>
+          <a:lnRef idx="2">
+            <a:schemeClr val="dk1"/>
+          </a:lnRef>
+          <a:fillRef idx="0">
+            <a:schemeClr val="dk1"/>
+          </a:fillRef>
+          <a:effectRef idx="1">
+            <a:schemeClr val="dk1"/>
+          </a:effectRef>
+          <a:fontRef idx="minor">
+            <a:schemeClr val="tx1"/>
+          </a:fontRef>
+        </p:style>
+      </p:cxnSp>
+      <p:cxnSp>
+        <p:nvCxnSpPr>
+          <p:cNvPr id="108" name="Straight Arrow Connector 107"/>
+          <p:cNvCxnSpPr>
+            <a:cxnSpLocks/>
+          </p:cNvCxnSpPr>
+          <p:nvPr/>
+        </p:nvCxnSpPr>
+        <p:spPr>
+          <a:xfrm flipV="1">
+            <a:off x="4381782" y="4055774"/>
+            <a:ext cx="462480" cy="8797"/>
+          </a:xfrm>
+          <a:prstGeom prst="straightConnector1">
+            <a:avLst/>
+          </a:prstGeom>
+          <a:ln w="19050" cmpd="sng">
+            <a:tailEnd type="arrow"/>
+          </a:ln>
+        </p:spPr>
+        <p:style>
+          <a:lnRef idx="2">
+            <a:schemeClr val="dk1"/>
+          </a:lnRef>
+          <a:fillRef idx="0">
+            <a:schemeClr val="dk1"/>
+          </a:fillRef>
+          <a:effectRef idx="1">
+            <a:schemeClr val="dk1"/>
+          </a:effectRef>
+          <a:fontRef idx="minor">
+            <a:schemeClr val="tx1"/>
+          </a:fontRef>
+        </p:style>
+      </p:cxnSp>
+      <p:cxnSp>
+        <p:nvCxnSpPr>
+          <p:cNvPr id="110" name="Straight Arrow Connector 109"/>
+          <p:cNvCxnSpPr>
+            <a:cxnSpLocks/>
+          </p:cNvCxnSpPr>
+          <p:nvPr/>
+        </p:nvCxnSpPr>
+        <p:spPr>
+          <a:xfrm>
+            <a:off x="7621870" y="4055773"/>
+            <a:ext cx="900000" cy="1"/>
+          </a:xfrm>
+          <a:prstGeom prst="straightConnector1">
+            <a:avLst/>
+          </a:prstGeom>
+          <a:ln w="19050" cmpd="sng">
+            <a:tailEnd type="arrow"/>
+          </a:ln>
+        </p:spPr>
+        <p:style>
+          <a:lnRef idx="2">
+            <a:schemeClr val="dk1"/>
+          </a:lnRef>
+          <a:fillRef idx="0">
+            <a:schemeClr val="dk1"/>
+          </a:fillRef>
+          <a:effectRef idx="1">
+            <a:schemeClr val="dk1"/>
+          </a:effectRef>
+          <a:fontRef idx="minor">
+            <a:schemeClr val="tx1"/>
+          </a:fontRef>
+        </p:style>
+      </p:cxnSp>
+      <p:sp>
+        <p:nvSpPr>
+          <p:cNvPr id="111" name="Rectangle 110"/>
+          <p:cNvSpPr/>
+          <p:nvPr/>
+        </p:nvSpPr>
+        <p:spPr>
+          <a:xfrm>
+            <a:off x="7649770" y="4189967"/>
+            <a:ext cx="693384" cy="311676"/>
+          </a:xfrm>
+          <a:prstGeom prst="rect">
+            <a:avLst/>
+          </a:prstGeom>
+          <a:noFill/>
+          <a:ln w="19050" cmpd="sng">
+            <a:noFill/>
+          </a:ln>
+        </p:spPr>
+        <p:style>
+          <a:lnRef idx="1">
+            <a:schemeClr val="accent1"/>
+          </a:lnRef>
+          <a:fillRef idx="3">
+            <a:schemeClr val="accent1"/>
+          </a:fillRef>
+          <a:effectRef idx="2">
+            <a:schemeClr val="accent1"/>
+          </a:effectRef>
+          <a:fontRef idx="minor">
+            <a:schemeClr val="lt1"/>
+          </a:fontRef>
+        </p:style>
+        <p:txBody>
+          <a:bodyPr rtlCol="0" anchor="ctr"/>
+          <a:lstStyle/>
+          <a:p>
+            <a:pPr algn="r"/>
+            <a:r>
+              <a:rPr lang="en-US" sz="1100" dirty="0" smtClean="0">
+                <a:solidFill>
+                  <a:schemeClr val="tx1"/>
+                </a:solidFill>
+                <a:latin typeface="Helvetica"/>
+                <a:cs typeface="Helvetica"/>
+              </a:rPr>
+              <a:t>Write</a:t>
+            </a:r>
+            <a:endParaRPr lang="en-US" sz="1100" dirty="0" smtClean="0">
+              <a:solidFill>
+                <a:schemeClr val="tx1"/>
+              </a:solidFill>
+              <a:latin typeface="Helvetica"/>
+              <a:cs typeface="Helvetica"/>
+            </a:endParaRPr>
+          </a:p>
+        </p:txBody>
+      </p:sp>
+      <p:cxnSp>
+        <p:nvCxnSpPr>
+          <p:cNvPr id="12" name="Elbow Connector 11"/>
+          <p:cNvCxnSpPr/>
+          <p:nvPr/>
+        </p:nvCxnSpPr>
+        <p:spPr>
+          <a:xfrm>
+            <a:off x="2311400" y="2853110"/>
+            <a:ext cx="720000" cy="720000"/>
+          </a:xfrm>
+          <a:prstGeom prst="bentConnector3">
+            <a:avLst/>
+          </a:prstGeom>
+          <a:ln>
+            <a:tailEnd type="arrow"/>
+          </a:ln>
+        </p:spPr>
+        <p:style>
+          <a:lnRef idx="2">
+            <a:schemeClr val="dk1"/>
+          </a:lnRef>
+          <a:fillRef idx="0">
+            <a:schemeClr val="dk1"/>
+          </a:fillRef>
+          <a:effectRef idx="1">
+            <a:schemeClr val="dk1"/>
+          </a:effectRef>
+          <a:fontRef idx="minor">
+            <a:schemeClr val="tx1"/>
+          </a:fontRef>
+        </p:style>
+      </p:cxnSp>
+      <p:sp>
+        <p:nvSpPr>
+          <p:cNvPr id="112" name="Rectangle 111"/>
+          <p:cNvSpPr/>
+          <p:nvPr/>
+        </p:nvSpPr>
+        <p:spPr>
+          <a:xfrm>
+            <a:off x="1219320" y="3888692"/>
+            <a:ext cx="693384" cy="311676"/>
+          </a:xfrm>
+          <a:prstGeom prst="rect">
+            <a:avLst/>
+          </a:prstGeom>
+          <a:noFill/>
+          <a:ln w="19050" cmpd="sng">
+            <a:noFill/>
+          </a:ln>
+        </p:spPr>
+        <p:style>
+          <a:lnRef idx="1">
+            <a:schemeClr val="accent1"/>
+          </a:lnRef>
+          <a:fillRef idx="3">
+            <a:schemeClr val="accent1"/>
+          </a:fillRef>
+          <a:effectRef idx="2">
+            <a:schemeClr val="accent1"/>
+          </a:effectRef>
+          <a:fontRef idx="minor">
+            <a:schemeClr val="lt1"/>
+          </a:fontRef>
+        </p:style>
+        <p:txBody>
+          <a:bodyPr rtlCol="0" anchor="ctr"/>
+          <a:lstStyle/>
+          <a:p>
+            <a:pPr algn="r"/>
+            <a:r>
+              <a:rPr lang="en-US" sz="1100" dirty="0" smtClean="0">
+                <a:solidFill>
+                  <a:schemeClr val="tx1"/>
+                </a:solidFill>
+                <a:latin typeface="Helvetica"/>
+                <a:cs typeface="Helvetica"/>
+              </a:rPr>
+              <a:t>Write</a:t>
+            </a:r>
+            <a:endParaRPr lang="en-US" sz="1100" dirty="0" smtClean="0">
+              <a:solidFill>
+                <a:schemeClr val="tx1"/>
+              </a:solidFill>
+              <a:latin typeface="Helvetica"/>
+              <a:cs typeface="Helvetica"/>
+            </a:endParaRPr>
+          </a:p>
+        </p:txBody>
+      </p:sp>
+      <p:cxnSp>
+        <p:nvCxnSpPr>
+          <p:cNvPr id="113" name="Straight Arrow Connector 112"/>
+          <p:cNvCxnSpPr>
+            <a:cxnSpLocks/>
+          </p:cNvCxnSpPr>
+          <p:nvPr/>
+        </p:nvCxnSpPr>
+        <p:spPr>
+          <a:xfrm flipV="1">
+            <a:off x="645320" y="4694166"/>
+            <a:ext cx="2160000" cy="1"/>
+          </a:xfrm>
+          <a:prstGeom prst="straightConnector1">
+            <a:avLst/>
+          </a:prstGeom>
+          <a:ln w="19050" cmpd="sng">
+            <a:headEnd type="arrow"/>
+            <a:tailEnd type="none"/>
+          </a:ln>
+        </p:spPr>
+        <p:style>
+          <a:lnRef idx="2">
+            <a:schemeClr val="dk1"/>
+          </a:lnRef>
+          <a:fillRef idx="0">
+            <a:schemeClr val="dk1"/>
+          </a:fillRef>
+          <a:effectRef idx="1">
+            <a:schemeClr val="dk1"/>
+          </a:effectRef>
+          <a:fontRef idx="minor">
+            <a:schemeClr val="tx1"/>
+          </a:fontRef>
+        </p:style>
+      </p:cxnSp>
+      <p:cxnSp>
+        <p:nvCxnSpPr>
+          <p:cNvPr id="114" name="Straight Arrow Connector 113"/>
+          <p:cNvCxnSpPr>
+            <a:cxnSpLocks/>
+          </p:cNvCxnSpPr>
+          <p:nvPr/>
+        </p:nvCxnSpPr>
+        <p:spPr>
+          <a:xfrm>
+            <a:off x="696120" y="4235596"/>
+            <a:ext cx="2160000" cy="1"/>
+          </a:xfrm>
+          <a:prstGeom prst="straightConnector1">
+            <a:avLst/>
+          </a:prstGeom>
+          <a:ln w="19050" cmpd="sng">
+            <a:tailEnd type="arrow"/>
+          </a:ln>
+        </p:spPr>
+        <p:style>
+          <a:lnRef idx="2">
+            <a:schemeClr val="dk1"/>
+          </a:lnRef>
+          <a:fillRef idx="0">
+            <a:schemeClr val="dk1"/>
+          </a:fillRef>
+          <a:effectRef idx="1">
+            <a:schemeClr val="dk1"/>
+          </a:effectRef>
+          <a:fontRef idx="minor">
+            <a:schemeClr val="tx1"/>
+          </a:fontRef>
+        </p:style>
+      </p:cxnSp>
+      <p:sp>
+        <p:nvSpPr>
+          <p:cNvPr id="118" name="Rectangle 117"/>
+          <p:cNvSpPr/>
+          <p:nvPr/>
+        </p:nvSpPr>
+        <p:spPr>
+          <a:xfrm>
+            <a:off x="1232020" y="4345892"/>
+            <a:ext cx="693384" cy="311676"/>
+          </a:xfrm>
+          <a:prstGeom prst="rect">
+            <a:avLst/>
+          </a:prstGeom>
+          <a:noFill/>
+          <a:ln w="19050" cmpd="sng">
+            <a:noFill/>
+          </a:ln>
+        </p:spPr>
+        <p:style>
+          <a:lnRef idx="1">
+            <a:schemeClr val="accent1"/>
+          </a:lnRef>
+          <a:fillRef idx="3">
+            <a:schemeClr val="accent1"/>
+          </a:fillRef>
+          <a:effectRef idx="2">
+            <a:schemeClr val="accent1"/>
+          </a:effectRef>
+          <a:fontRef idx="minor">
+            <a:schemeClr val="lt1"/>
+          </a:fontRef>
+        </p:style>
+        <p:txBody>
+          <a:bodyPr rtlCol="0" anchor="ctr"/>
+          <a:lstStyle/>
+          <a:p>
+            <a:pPr algn="r"/>
+            <a:r>
+              <a:rPr lang="en-US" sz="1100" dirty="0" smtClean="0">
+                <a:solidFill>
+                  <a:schemeClr val="tx1"/>
+                </a:solidFill>
+                <a:latin typeface="Helvetica"/>
+                <a:cs typeface="Helvetica"/>
+              </a:rPr>
+              <a:t>Read</a:t>
+            </a:r>
+            <a:endParaRPr lang="en-US" sz="1100" dirty="0" smtClean="0">
+              <a:solidFill>
+                <a:schemeClr val="tx1"/>
+              </a:solidFill>
+              <a:latin typeface="Helvetica"/>
+              <a:cs typeface="Helvetica"/>
+            </a:endParaRPr>
+          </a:p>
+        </p:txBody>
+      </p:sp>
+      <p:sp>
+        <p:nvSpPr>
+          <p:cNvPr id="120" name="Left Brace 119"/>
+          <p:cNvSpPr/>
+          <p:nvPr/>
+        </p:nvSpPr>
+        <p:spPr>
+          <a:xfrm rot="5400000">
+            <a:off x="4317681" y="-1873561"/>
+            <a:ext cx="391437" cy="6264000"/>
+          </a:xfrm>
+          <a:prstGeom prst="leftBrace">
+            <a:avLst>
+              <a:gd name="adj1" fmla="val 39261"/>
+              <a:gd name="adj2" fmla="val 49197"/>
+            </a:avLst>
+          </a:prstGeom>
+          <a:noFill/>
+          <a:ln w="19050" cmpd="sng">
+            <a:solidFill>
+              <a:schemeClr val="tx1"/>
+            </a:solidFill>
+          </a:ln>
+        </p:spPr>
+        <p:style>
+          <a:lnRef idx="1">
+            <a:schemeClr val="accent1"/>
+          </a:lnRef>
+          <a:fillRef idx="3">
+            <a:schemeClr val="accent1"/>
+          </a:fillRef>
+          <a:effectRef idx="2">
+            <a:schemeClr val="accent1"/>
+          </a:effectRef>
+          <a:fontRef idx="minor">
+            <a:schemeClr val="lt1"/>
+          </a:fontRef>
+        </p:style>
+        <p:txBody>
+          <a:bodyPr rtlCol="0" anchor="ctr"/>
+          <a:lstStyle/>
+          <a:p>
+            <a:pPr algn="ctr"/>
+            <a:endParaRPr lang="en-US" sz="1600">
+              <a:latin typeface="Helvetica"/>
+              <a:cs typeface="Helvetica"/>
+            </a:endParaRPr>
+          </a:p>
+        </p:txBody>
+      </p:sp>
+      <p:sp>
+        <p:nvSpPr>
+          <p:cNvPr id="121" name="TextBox 120"/>
+          <p:cNvSpPr txBox="1"/>
+          <p:nvPr/>
+        </p:nvSpPr>
+        <p:spPr>
+          <a:xfrm>
+            <a:off x="3079338" y="427546"/>
+            <a:ext cx="2965861" cy="584776"/>
+          </a:xfrm>
+          <a:prstGeom prst="rect">
+            <a:avLst/>
+          </a:prstGeom>
+          <a:noFill/>
+          <a:ln w="19050" cmpd="sng">
+            <a:noFill/>
+          </a:ln>
+        </p:spPr>
+        <p:txBody>
+          <a:bodyPr wrap="square" rtlCol="0">
+            <a:spAutoFit/>
+          </a:bodyPr>
+          <a:lstStyle/>
+          <a:p>
+            <a:pPr algn="ctr"/>
+            <a:r>
+              <a:rPr lang="en-US" sz="1600" dirty="0" smtClean="0">
+                <a:latin typeface="Helvetica"/>
+                <a:cs typeface="Helvetica"/>
+              </a:rPr>
+              <a:t>Load Balancing Proxy </a:t>
+            </a:r>
+            <a:r>
+              <a:rPr lang="en-US" sz="1600" dirty="0">
+                <a:latin typeface="Helvetica"/>
+                <a:cs typeface="Helvetica"/>
+              </a:rPr>
+              <a:t>W</a:t>
+            </a:r>
+            <a:r>
+              <a:rPr lang="en-US" sz="1600" dirty="0" smtClean="0">
+                <a:latin typeface="Helvetica"/>
+                <a:cs typeface="Helvetica"/>
+              </a:rPr>
+              <a:t>ith </a:t>
+            </a:r>
+            <a:r>
+              <a:rPr lang="en-US" sz="1600" dirty="0">
+                <a:latin typeface="Helvetica"/>
+                <a:cs typeface="Helvetica"/>
+              </a:rPr>
+              <a:t>Content Counting</a:t>
+            </a:r>
+            <a:endParaRPr lang="en-US" sz="1600" dirty="0">
+              <a:latin typeface="Helvetica"/>
+              <a:cs typeface="Helvetica"/>
+            </a:endParaRPr>
+          </a:p>
+        </p:txBody>
+      </p:sp>
+    </p:spTree>
+    <p:extLst>
+      <p:ext uri="{BB962C8B-B14F-4D97-AF65-F5344CB8AC3E}">
+        <p14:creationId xmlns:p14="http://schemas.microsoft.com/office/powerpoint/2010/main" val="3730522394"/>
+      </p:ext>
+    </p:extLst>
+  </p:cSld>
+  <p:clrMapOvr>
+    <a:masterClrMapping/>
+  </p:clrMapOvr>
+  <p:timing>
+    <p:tnLst>
+      <p:par>
+        <p:cTn xmlns:p14="http://schemas.microsoft.com/office/powerpoint/2010/main" id="1" dur="indefinite" restart="never" nodeType="tmRoot"/>
+      </p:par>
+    </p:tnLst>
+  </p:timing>
+</p:sld>
+</file>
+
+<file path=ppt/slides/slide4.xml><?xml version="1.0" encoding="utf-8"?>
+<p:sld xmlns:a="http://schemas.openxmlformats.org/drawingml/2006/main" xmlns:r="http://schemas.openxmlformats.org/officeDocument/2006/relationships" xmlns:p="http://schemas.openxmlformats.org/presentationml/2006/main">
+  <p:cSld>
+    <p:spTree>
+      <p:nvGrpSpPr>
+        <p:cNvPr id="1" name=""/>
+        <p:cNvGrpSpPr/>
+        <p:nvPr/>
+      </p:nvGrpSpPr>
+      <p:grpSpPr>
+        <a:xfrm>
+          <a:off x="0" y="0"/>
+          <a:ext cx="0" cy="0"/>
+          <a:chOff x="0" y="0"/>
+          <a:chExt cx="0" cy="0"/>
+        </a:xfrm>
+      </p:grpSpPr>
+      <p:sp>
+        <p:nvSpPr>
           <p:cNvPr id="126" name="Rectangle 125"/>
           <p:cNvSpPr/>
           <p:nvPr/>
@@ -7444,13 +8765,6 @@
               </a:rPr>
               <a:t>Accept Loop</a:t>
             </a:r>
-            <a:endParaRPr lang="en-US" sz="1000" dirty="0" smtClean="0">
-              <a:solidFill>
-                <a:schemeClr val="tx1"/>
-              </a:solidFill>
-              <a:latin typeface="Helvetica"/>
-              <a:cs typeface="Helvetica"/>
-            </a:endParaRPr>
           </a:p>
         </p:txBody>
       </p:sp>
@@ -8305,13 +9619,6 @@
               </a:rPr>
               <a:t>Configuration</a:t>
             </a:r>
-            <a:endParaRPr lang="en-US" sz="1000" dirty="0" smtClean="0">
-              <a:solidFill>
-                <a:schemeClr val="tx1"/>
-              </a:solidFill>
-              <a:latin typeface="Helvetica"/>
-              <a:cs typeface="Helvetica"/>
-            </a:endParaRPr>
           </a:p>
         </p:txBody>
       </p:sp>
@@ -8962,13 +10269,6 @@
               </a:rPr>
               <a:t>Connect</a:t>
             </a:r>
-            <a:endParaRPr lang="en-US" sz="1000" dirty="0" smtClean="0">
-              <a:solidFill>
-                <a:schemeClr val="tx1"/>
-              </a:solidFill>
-              <a:latin typeface="Helvetica"/>
-              <a:cs typeface="Helvetica"/>
-            </a:endParaRPr>
           </a:p>
         </p:txBody>
       </p:sp>
@@ -9019,13 +10319,6 @@
               </a:rPr>
               <a:t>Write</a:t>
             </a:r>
-            <a:endParaRPr lang="en-US" sz="1000" dirty="0" smtClean="0">
-              <a:solidFill>
-                <a:schemeClr val="tx1"/>
-              </a:solidFill>
-              <a:latin typeface="Helvetica"/>
-              <a:cs typeface="Helvetica"/>
-            </a:endParaRPr>
           </a:p>
         </p:txBody>
       </p:sp>
@@ -9147,13 +10440,6 @@
               </a:rPr>
               <a:t>Read</a:t>
             </a:r>
-            <a:endParaRPr lang="en-US" sz="1000" dirty="0" smtClean="0">
-              <a:solidFill>
-                <a:schemeClr val="tx1"/>
-              </a:solidFill>
-              <a:latin typeface="Helvetica"/>
-              <a:cs typeface="Helvetica"/>
-            </a:endParaRPr>
           </a:p>
         </p:txBody>
       </p:sp>
@@ -9304,13 +10590,6 @@
               </a:rPr>
               <a:t>Connect</a:t>
             </a:r>
-            <a:endParaRPr lang="en-US" sz="1000" dirty="0" smtClean="0">
-              <a:solidFill>
-                <a:schemeClr val="tx1"/>
-              </a:solidFill>
-              <a:latin typeface="Helvetica"/>
-              <a:cs typeface="Helvetica"/>
-            </a:endParaRPr>
           </a:p>
         </p:txBody>
       </p:sp>
@@ -9397,13 +10676,6 @@
               </a:rPr>
               <a:t>Read</a:t>
             </a:r>
-            <a:endParaRPr lang="en-US" sz="1000" dirty="0" smtClean="0">
-              <a:solidFill>
-                <a:schemeClr val="tx1"/>
-              </a:solidFill>
-              <a:latin typeface="Helvetica"/>
-              <a:cs typeface="Helvetica"/>
-            </a:endParaRPr>
           </a:p>
         </p:txBody>
       </p:sp>
@@ -9491,13 +10763,6 @@
               </a:rPr>
               <a:t>Write</a:t>
             </a:r>
-            <a:endParaRPr lang="en-US" sz="1000" dirty="0" smtClean="0">
-              <a:solidFill>
-                <a:schemeClr val="tx1"/>
-              </a:solidFill>
-              <a:latin typeface="Helvetica"/>
-              <a:cs typeface="Helvetica"/>
-            </a:endParaRPr>
           </a:p>
         </p:txBody>
       </p:sp>

</xml_diff>

<commit_message>
SESSION evaluation added to the report
</commit_message>
<xml_diff>
--- a/report/overview_diagrams.pptx
+++ b/report/overview_diagrams.pptx
@@ -9,6 +9,7 @@
     <p:sldId id="261" r:id="rId3"/>
     <p:sldId id="262" r:id="rId4"/>
     <p:sldId id="260" r:id="rId5"/>
+    <p:sldId id="263" r:id="rId6"/>
   </p:sldIdLst>
   <p:sldSz cx="9144000" cy="6858000" type="screen4x3"/>
   <p:notesSz cx="6858000" cy="9144000"/>
@@ -10328,6 +10329,66 @@
       </p:par>
     </p:tnLst>
   </p:timing>
+</p:sld>
+</file>
+
+<file path=ppt/slides/slide5.xml><?xml version="1.0" encoding="utf-8"?>
+<p:sld xmlns:a="http://schemas.openxmlformats.org/drawingml/2006/main" xmlns:r="http://schemas.openxmlformats.org/officeDocument/2006/relationships" xmlns:p="http://schemas.openxmlformats.org/presentationml/2006/main">
+  <p:cSld>
+    <p:spTree>
+      <p:nvGrpSpPr>
+        <p:cNvPr id="1" name=""/>
+        <p:cNvGrpSpPr/>
+        <p:nvPr/>
+      </p:nvGrpSpPr>
+      <p:grpSpPr>
+        <a:xfrm>
+          <a:off x="0" y="0"/>
+          <a:ext cx="0" cy="0"/>
+          <a:chOff x="0" y="0"/>
+          <a:chExt cx="0" cy="0"/>
+        </a:xfrm>
+      </p:grpSpPr>
+      <p:pic>
+        <p:nvPicPr>
+          <p:cNvPr id="2" name="Picture 1" descr="couchbase_cluster.png"/>
+          <p:cNvPicPr>
+            <a:picLocks noChangeAspect="1"/>
+          </p:cNvPicPr>
+          <p:nvPr/>
+        </p:nvPicPr>
+        <p:blipFill>
+          <a:blip r:embed="rId2">
+            <a:extLst>
+              <a:ext uri="{28A0092B-C50C-407E-A947-70E740481C1C}">
+                <a14:useLocalDpi xmlns:a14="http://schemas.microsoft.com/office/drawing/2010/main" val="0"/>
+              </a:ext>
+            </a:extLst>
+          </a:blip>
+          <a:stretch>
+            <a:fillRect/>
+          </a:stretch>
+        </p:blipFill>
+        <p:spPr>
+          <a:xfrm>
+            <a:off x="0" y="1282700"/>
+            <a:ext cx="9144000" cy="4275117"/>
+          </a:xfrm>
+          <a:prstGeom prst="rect">
+            <a:avLst/>
+          </a:prstGeom>
+        </p:spPr>
+      </p:pic>
+    </p:spTree>
+    <p:extLst>
+      <p:ext uri="{BB962C8B-B14F-4D97-AF65-F5344CB8AC3E}">
+        <p14:creationId xmlns:p14="http://schemas.microsoft.com/office/powerpoint/2010/main" val="2898682451"/>
+      </p:ext>
+    </p:extLst>
+  </p:cSld>
+  <p:clrMapOvr>
+    <a:masterClrMapping/>
+  </p:clrMapOvr>
 </p:sld>
 </file>
 

</xml_diff>